<commit_message>
Including budget data in PIR documentation
</commit_message>
<xml_diff>
--- a/documentation/PIR ERD.pptx
+++ b/documentation/PIR ERD.pptx
@@ -584,7 +584,7 @@
           <a:p>
             <a:fld id="{846CE7D5-CF57-46EF-B807-FDD0502418D4}" type="datetimeFigureOut">
               <a:rPr lang="en-US" smtClean="0"/>
-              <a:t>5/8/2025</a:t>
+              <a:t>6/9/2025</a:t>
             </a:fld>
             <a:endParaRPr lang="en-US"/>
           </a:p>
@@ -754,7 +754,7 @@
           <a:p>
             <a:fld id="{846CE7D5-CF57-46EF-B807-FDD0502418D4}" type="datetimeFigureOut">
               <a:rPr lang="en-US" smtClean="0"/>
-              <a:t>5/8/2025</a:t>
+              <a:t>6/9/2025</a:t>
             </a:fld>
             <a:endParaRPr lang="en-US"/>
           </a:p>
@@ -934,7 +934,7 @@
           <a:p>
             <a:fld id="{846CE7D5-CF57-46EF-B807-FDD0502418D4}" type="datetimeFigureOut">
               <a:rPr lang="en-US" smtClean="0"/>
-              <a:t>5/8/2025</a:t>
+              <a:t>6/9/2025</a:t>
             </a:fld>
             <a:endParaRPr lang="en-US"/>
           </a:p>
@@ -1104,7 +1104,7 @@
           <a:p>
             <a:fld id="{846CE7D5-CF57-46EF-B807-FDD0502418D4}" type="datetimeFigureOut">
               <a:rPr lang="en-US" smtClean="0"/>
-              <a:t>5/8/2025</a:t>
+              <a:t>6/9/2025</a:t>
             </a:fld>
             <a:endParaRPr lang="en-US"/>
           </a:p>
@@ -1350,7 +1350,7 @@
           <a:p>
             <a:fld id="{846CE7D5-CF57-46EF-B807-FDD0502418D4}" type="datetimeFigureOut">
               <a:rPr lang="en-US" smtClean="0"/>
-              <a:t>5/8/2025</a:t>
+              <a:t>6/9/2025</a:t>
             </a:fld>
             <a:endParaRPr lang="en-US"/>
           </a:p>
@@ -1582,7 +1582,7 @@
           <a:p>
             <a:fld id="{846CE7D5-CF57-46EF-B807-FDD0502418D4}" type="datetimeFigureOut">
               <a:rPr lang="en-US" smtClean="0"/>
-              <a:t>5/8/2025</a:t>
+              <a:t>6/9/2025</a:t>
             </a:fld>
             <a:endParaRPr lang="en-US"/>
           </a:p>
@@ -1949,7 +1949,7 @@
           <a:p>
             <a:fld id="{846CE7D5-CF57-46EF-B807-FDD0502418D4}" type="datetimeFigureOut">
               <a:rPr lang="en-US" smtClean="0"/>
-              <a:t>5/8/2025</a:t>
+              <a:t>6/9/2025</a:t>
             </a:fld>
             <a:endParaRPr lang="en-US"/>
           </a:p>
@@ -2067,7 +2067,7 @@
           <a:p>
             <a:fld id="{846CE7D5-CF57-46EF-B807-FDD0502418D4}" type="datetimeFigureOut">
               <a:rPr lang="en-US" smtClean="0"/>
-              <a:t>5/8/2025</a:t>
+              <a:t>6/9/2025</a:t>
             </a:fld>
             <a:endParaRPr lang="en-US"/>
           </a:p>
@@ -2162,7 +2162,7 @@
           <a:p>
             <a:fld id="{846CE7D5-CF57-46EF-B807-FDD0502418D4}" type="datetimeFigureOut">
               <a:rPr lang="en-US" smtClean="0"/>
-              <a:t>5/8/2025</a:t>
+              <a:t>6/9/2025</a:t>
             </a:fld>
             <a:endParaRPr lang="en-US"/>
           </a:p>
@@ -2439,7 +2439,7 @@
           <a:p>
             <a:fld id="{846CE7D5-CF57-46EF-B807-FDD0502418D4}" type="datetimeFigureOut">
               <a:rPr lang="en-US" smtClean="0"/>
-              <a:t>5/8/2025</a:t>
+              <a:t>6/9/2025</a:t>
             </a:fld>
             <a:endParaRPr lang="en-US"/>
           </a:p>
@@ -2696,7 +2696,7 @@
           <a:p>
             <a:fld id="{846CE7D5-CF57-46EF-B807-FDD0502418D4}" type="datetimeFigureOut">
               <a:rPr lang="en-US" smtClean="0"/>
-              <a:t>5/8/2025</a:t>
+              <a:t>6/9/2025</a:t>
             </a:fld>
             <a:endParaRPr lang="en-US"/>
           </a:p>
@@ -2909,7 +2909,7 @@
           <a:p>
             <a:fld id="{846CE7D5-CF57-46EF-B807-FDD0502418D4}" type="datetimeFigureOut">
               <a:rPr lang="en-US" smtClean="0"/>
-              <a:t>5/8/2025</a:t>
+              <a:t>6/9/2025</a:t>
             </a:fld>
             <a:endParaRPr lang="en-US"/>
           </a:p>
@@ -3329,7 +3329,7 @@
           <p:nvPr>
             <p:extLst>
               <p:ext uri="{D42A27DB-BD31-4B8C-83A1-F6EECF244321}">
-                <p14:modId xmlns:p14="http://schemas.microsoft.com/office/powerpoint/2010/main" val="1014049970"/>
+                <p14:modId xmlns:p14="http://schemas.microsoft.com/office/powerpoint/2010/main" val="3893314169"/>
               </p:ext>
             </p:extLst>
           </p:nvPr>
@@ -3500,7 +3500,7 @@
                         <a:rPr lang="en-US" sz="1200" dirty="0">
                           <a:latin typeface="Calibri"/>
                         </a:rPr>
-                        <a:t>year</a:t>
+                        <a:t>int</a:t>
                       </a:r>
                     </a:p>
                   </a:txBody>
@@ -3568,7 +3568,7 @@
           <p:nvPr>
             <p:extLst>
               <p:ext uri="{D42A27DB-BD31-4B8C-83A1-F6EECF244321}">
-                <p14:modId xmlns:p14="http://schemas.microsoft.com/office/powerpoint/2010/main" val="3319619720"/>
+                <p14:modId xmlns:p14="http://schemas.microsoft.com/office/powerpoint/2010/main" val="3019996634"/>
               </p:ext>
             </p:extLst>
           </p:nvPr>
@@ -3696,7 +3696,7 @@
                         <a:rPr lang="en-US" sz="1200" dirty="0">
                           <a:latin typeface="Calibri"/>
                         </a:rPr>
-                        <a:t>year</a:t>
+                        <a:t>int</a:t>
                       </a:r>
                     </a:p>
                   </a:txBody>
@@ -3914,7 +3914,7 @@
                           </a:solidFill>
                           <a:latin typeface="Calibri"/>
                         </a:rPr>
-                        <a:t>float</a:t>
+                        <a:t>numeric</a:t>
                       </a:r>
                       <a:endParaRPr lang="en-US" sz="1200" dirty="0">
                         <a:latin typeface="Calibri"/>
@@ -4141,7 +4141,7 @@
           <p:nvPr>
             <p:extLst>
               <p:ext uri="{D42A27DB-BD31-4B8C-83A1-F6EECF244321}">
-                <p14:modId xmlns:p14="http://schemas.microsoft.com/office/powerpoint/2010/main" val="628555806"/>
+                <p14:modId xmlns:p14="http://schemas.microsoft.com/office/powerpoint/2010/main" val="2441736997"/>
               </p:ext>
             </p:extLst>
           </p:nvPr>
@@ -4266,7 +4266,7 @@
                         <a:rPr lang="en-US" sz="1200" dirty="0">
                           <a:latin typeface="Calibri"/>
                         </a:rPr>
-                        <a:t>year</a:t>
+                        <a:t>int</a:t>
                       </a:r>
                     </a:p>
                   </a:txBody>
@@ -5485,13 +5485,13 @@
           <p:nvPr>
             <p:extLst>
               <p:ext uri="{D42A27DB-BD31-4B8C-83A1-F6EECF244321}">
-                <p14:modId xmlns:p14="http://schemas.microsoft.com/office/powerpoint/2010/main" val="2432879339"/>
+                <p14:modId xmlns:p14="http://schemas.microsoft.com/office/powerpoint/2010/main" val="4205034209"/>
               </p:ext>
             </p:extLst>
           </p:nvPr>
         </p:nvGraphicFramePr>
         <p:xfrm>
-          <a:off x="4833247" y="3863090"/>
+          <a:off x="7874083" y="4108020"/>
           <a:ext cx="2525506" cy="2537634"/>
         </p:xfrm>
         <a:graphic>
@@ -6314,13 +6314,15 @@
               </a:ext>
             </a:extLst>
           </p:cNvPr>
-          <p:cNvCxnSpPr/>
+          <p:cNvCxnSpPr>
+            <a:cxnSpLocks/>
+          </p:cNvCxnSpPr>
           <p:nvPr/>
         </p:nvCxnSpPr>
         <p:spPr>
           <a:xfrm flipH="1">
-            <a:off x="7358753" y="4717701"/>
-            <a:ext cx="327148" cy="0"/>
+            <a:off x="7685901" y="4971701"/>
+            <a:ext cx="188182" cy="0"/>
           </a:xfrm>
           <a:prstGeom prst="line">
             <a:avLst/>
@@ -6422,13 +6424,15 @@
               </a:ext>
             </a:extLst>
           </p:cNvPr>
-          <p:cNvCxnSpPr/>
+          <p:cNvCxnSpPr>
+            <a:cxnSpLocks/>
+          </p:cNvCxnSpPr>
           <p:nvPr/>
         </p:nvCxnSpPr>
         <p:spPr>
           <a:xfrm flipH="1">
-            <a:off x="7365234" y="5056496"/>
-            <a:ext cx="320667" cy="0"/>
+            <a:off x="7691972" y="5311301"/>
+            <a:ext cx="182111" cy="0"/>
           </a:xfrm>
           <a:prstGeom prst="line">
             <a:avLst/>
@@ -6458,13 +6462,15 @@
               </a:ext>
             </a:extLst>
           </p:cNvPr>
-          <p:cNvCxnSpPr/>
+          <p:cNvCxnSpPr>
+            <a:cxnSpLocks/>
+          </p:cNvCxnSpPr>
           <p:nvPr/>
         </p:nvCxnSpPr>
         <p:spPr>
           <a:xfrm>
             <a:off x="7685901" y="5056496"/>
-            <a:ext cx="0" cy="366061"/>
+            <a:ext cx="0" cy="624956"/>
           </a:xfrm>
           <a:prstGeom prst="line">
             <a:avLst/>
@@ -6494,13 +6500,15 @@
               </a:ext>
             </a:extLst>
           </p:cNvPr>
-          <p:cNvCxnSpPr/>
+          <p:cNvCxnSpPr>
+            <a:cxnSpLocks/>
+          </p:cNvCxnSpPr>
           <p:nvPr/>
         </p:nvCxnSpPr>
         <p:spPr>
           <a:xfrm flipH="1">
-            <a:off x="7365234" y="5422557"/>
-            <a:ext cx="320667" cy="0"/>
+            <a:off x="7683670" y="5681452"/>
+            <a:ext cx="190413" cy="0"/>
           </a:xfrm>
           <a:prstGeom prst="line">
             <a:avLst/>
@@ -6622,6 +6630,785 @@
             <a:r>
               <a:rPr lang="en-US" sz="1000" dirty="0"/>
               <a:t>1:N</a:t>
+            </a:r>
+          </a:p>
+        </p:txBody>
+      </p:sp>
+      <p:graphicFrame>
+        <p:nvGraphicFramePr>
+          <p:cNvPr id="3" name="Table 2">
+            <a:extLst>
+              <a:ext uri="{FF2B5EF4-FFF2-40B4-BE49-F238E27FC236}">
+                <a16:creationId xmlns:a16="http://schemas.microsoft.com/office/drawing/2014/main" id="{229FC5D4-24D0-0DAD-3CF9-5318A74B5CF7}"/>
+              </a:ext>
+            </a:extLst>
+          </p:cNvPr>
+          <p:cNvGraphicFramePr>
+            <a:graphicFrameLocks noGrp="1"/>
+          </p:cNvGraphicFramePr>
+          <p:nvPr>
+            <p:extLst>
+              <p:ext uri="{D42A27DB-BD31-4B8C-83A1-F6EECF244321}">
+                <p14:modId xmlns:p14="http://schemas.microsoft.com/office/powerpoint/2010/main" val="4054512664"/>
+              </p:ext>
+            </p:extLst>
+          </p:nvPr>
+        </p:nvGraphicFramePr>
+        <p:xfrm>
+          <a:off x="4730876" y="4108020"/>
+          <a:ext cx="2680078" cy="2630872"/>
+        </p:xfrm>
+        <a:graphic>
+          <a:graphicData uri="http://schemas.openxmlformats.org/drawingml/2006/table">
+            <a:tbl>
+              <a:tblPr firstRow="1" bandRow="1">
+                <a:tableStyleId>{5C22544A-7EE6-4342-B048-85BDC9FD1C3A}</a:tableStyleId>
+              </a:tblPr>
+              <a:tblGrid>
+                <a:gridCol w="1340039">
+                  <a:extLst>
+                    <a:ext uri="{9D8B030D-6E8A-4147-A177-3AD203B41FA5}">
+                      <a16:colId xmlns:a16="http://schemas.microsoft.com/office/drawing/2014/main" val="416149133"/>
+                    </a:ext>
+                  </a:extLst>
+                </a:gridCol>
+                <a:gridCol w="1340039">
+                  <a:extLst>
+                    <a:ext uri="{9D8B030D-6E8A-4147-A177-3AD203B41FA5}">
+                      <a16:colId xmlns:a16="http://schemas.microsoft.com/office/drawing/2014/main" val="2133328335"/>
+                    </a:ext>
+                  </a:extLst>
+                </a:gridCol>
+              </a:tblGrid>
+              <a:tr h="214232">
+                <a:tc gridSpan="2">
+                  <a:txBody>
+                    <a:bodyPr/>
+                    <a:lstStyle/>
+                    <a:p>
+                      <a:r>
+                        <a:rPr lang="en-US" sz="1200" dirty="0">
+                          <a:latin typeface="Calibri"/>
+                        </a:rPr>
+                        <a:t>Budget</a:t>
+                      </a:r>
+                    </a:p>
+                  </a:txBody>
+                  <a:tcPr/>
+                </a:tc>
+                <a:tc hMerge="1">
+                  <a:txBody>
+                    <a:bodyPr/>
+                    <a:lstStyle/>
+                    <a:p>
+                      <a:endParaRPr lang="en-US"/>
+                    </a:p>
+                  </a:txBody>
+                  <a:tcPr/>
+                </a:tc>
+                <a:extLst>
+                  <a:ext uri="{0D108BD9-81ED-4DB2-BD59-A6C34878D82A}">
+                    <a16:rowId xmlns:a16="http://schemas.microsoft.com/office/drawing/2014/main" val="519363728"/>
+                  </a:ext>
+                </a:extLst>
+              </a:tr>
+              <a:tr h="214232">
+                <a:tc>
+                  <a:txBody>
+                    <a:bodyPr/>
+                    <a:lstStyle/>
+                    <a:p>
+                      <a:pPr algn="l" fontAlgn="b"/>
+                      <a:r>
+                        <a:rPr lang="en-US" sz="1100" b="0" i="0" u="none" strike="noStrike" dirty="0">
+                          <a:solidFill>
+                            <a:srgbClr val="000000"/>
+                          </a:solidFill>
+                          <a:effectLst/>
+                          <a:latin typeface="Aptos Narrow" panose="020B0004020202020204" pitchFamily="34" charset="0"/>
+                        </a:rPr>
+                        <a:t>region</a:t>
+                      </a:r>
+                    </a:p>
+                  </a:txBody>
+                  <a:tcPr marL="6350" marR="6350" marT="6350" marB="0" anchor="b"/>
+                </a:tc>
+                <a:tc>
+                  <a:txBody>
+                    <a:bodyPr/>
+                    <a:lstStyle/>
+                    <a:p>
+                      <a:pPr algn="l" fontAlgn="b"/>
+                      <a:r>
+                        <a:rPr lang="en-US" sz="1100" b="0" i="0" u="none" strike="noStrike">
+                          <a:solidFill>
+                            <a:srgbClr val="000000"/>
+                          </a:solidFill>
+                          <a:effectLst/>
+                          <a:latin typeface="Aptos Narrow" panose="020B0004020202020204" pitchFamily="34" charset="0"/>
+                        </a:rPr>
+                        <a:t>int</a:t>
+                      </a:r>
+                    </a:p>
+                  </a:txBody>
+                  <a:tcPr marL="6350" marR="6350" marT="6350" marB="0" anchor="b"/>
+                </a:tc>
+                <a:extLst>
+                  <a:ext uri="{0D108BD9-81ED-4DB2-BD59-A6C34878D82A}">
+                    <a16:rowId xmlns:a16="http://schemas.microsoft.com/office/drawing/2014/main" val="1565076320"/>
+                  </a:ext>
+                </a:extLst>
+              </a:tr>
+              <a:tr h="214232">
+                <a:tc>
+                  <a:txBody>
+                    <a:bodyPr/>
+                    <a:lstStyle/>
+                    <a:p>
+                      <a:pPr algn="l" fontAlgn="b"/>
+                      <a:r>
+                        <a:rPr lang="en-US" sz="1100" b="0" i="0" u="none" strike="noStrike" dirty="0" err="1">
+                          <a:solidFill>
+                            <a:srgbClr val="000000"/>
+                          </a:solidFill>
+                          <a:effectLst/>
+                          <a:latin typeface="Aptos Narrow" panose="020B0004020202020204" pitchFamily="34" charset="0"/>
+                        </a:rPr>
+                        <a:t>prg</a:t>
+                      </a:r>
+                      <a:endParaRPr lang="en-US" sz="1100" b="0" i="0" u="none" strike="noStrike" dirty="0">
+                        <a:solidFill>
+                          <a:srgbClr val="000000"/>
+                        </a:solidFill>
+                        <a:effectLst/>
+                        <a:latin typeface="Aptos Narrow" panose="020B0004020202020204" pitchFamily="34" charset="0"/>
+                      </a:endParaRPr>
+                    </a:p>
+                  </a:txBody>
+                  <a:tcPr marL="6350" marR="6350" marT="6350" marB="0" anchor="b"/>
+                </a:tc>
+                <a:tc>
+                  <a:txBody>
+                    <a:bodyPr/>
+                    <a:lstStyle/>
+                    <a:p>
+                      <a:pPr algn="l" fontAlgn="b"/>
+                      <a:r>
+                        <a:rPr lang="en-US" sz="1100" b="0" i="0" u="none" strike="noStrike">
+                          <a:solidFill>
+                            <a:srgbClr val="000000"/>
+                          </a:solidFill>
+                          <a:effectLst/>
+                          <a:latin typeface="Aptos Narrow" panose="020B0004020202020204" pitchFamily="34" charset="0"/>
+                        </a:rPr>
+                        <a:t>varchar(2)</a:t>
+                      </a:r>
+                    </a:p>
+                  </a:txBody>
+                  <a:tcPr marL="6350" marR="6350" marT="6350" marB="0" anchor="b"/>
+                </a:tc>
+                <a:extLst>
+                  <a:ext uri="{0D108BD9-81ED-4DB2-BD59-A6C34878D82A}">
+                    <a16:rowId xmlns:a16="http://schemas.microsoft.com/office/drawing/2014/main" val="659179970"/>
+                  </a:ext>
+                </a:extLst>
+              </a:tr>
+              <a:tr h="214232">
+                <a:tc>
+                  <a:txBody>
+                    <a:bodyPr/>
+                    <a:lstStyle/>
+                    <a:p>
+                      <a:pPr algn="l" fontAlgn="b"/>
+                      <a:r>
+                        <a:rPr lang="en-US" sz="1100" b="0" i="0" u="none" strike="noStrike" dirty="0">
+                          <a:solidFill>
+                            <a:srgbClr val="000000"/>
+                          </a:solidFill>
+                          <a:effectLst/>
+                          <a:latin typeface="Aptos Narrow" panose="020B0004020202020204" pitchFamily="34" charset="0"/>
+                        </a:rPr>
+                        <a:t>type</a:t>
+                      </a:r>
+                    </a:p>
+                  </a:txBody>
+                  <a:tcPr marL="6350" marR="6350" marT="6350" marB="0" anchor="b"/>
+                </a:tc>
+                <a:tc>
+                  <a:txBody>
+                    <a:bodyPr/>
+                    <a:lstStyle/>
+                    <a:p>
+                      <a:pPr algn="l" fontAlgn="b"/>
+                      <a:r>
+                        <a:rPr lang="en-US" sz="1100" b="0" i="0" u="none" strike="noStrike" dirty="0">
+                          <a:solidFill>
+                            <a:srgbClr val="000000"/>
+                          </a:solidFill>
+                          <a:effectLst/>
+                          <a:latin typeface="Aptos Narrow" panose="020B0004020202020204" pitchFamily="34" charset="0"/>
+                        </a:rPr>
+                        <a:t>varchar(10)</a:t>
+                      </a:r>
+                    </a:p>
+                  </a:txBody>
+                  <a:tcPr marL="6350" marR="6350" marT="6350" marB="0" anchor="b"/>
+                </a:tc>
+                <a:extLst>
+                  <a:ext uri="{0D108BD9-81ED-4DB2-BD59-A6C34878D82A}">
+                    <a16:rowId xmlns:a16="http://schemas.microsoft.com/office/drawing/2014/main" val="1920189662"/>
+                  </a:ext>
+                </a:extLst>
+              </a:tr>
+              <a:tr h="214232">
+                <a:tc>
+                  <a:txBody>
+                    <a:bodyPr/>
+                    <a:lstStyle/>
+                    <a:p>
+                      <a:pPr algn="l" fontAlgn="b"/>
+                      <a:r>
+                        <a:rPr lang="en-US" sz="1100" b="0" i="0" u="none" strike="noStrike" dirty="0" err="1">
+                          <a:solidFill>
+                            <a:srgbClr val="000000"/>
+                          </a:solidFill>
+                          <a:effectLst/>
+                          <a:latin typeface="Aptos Narrow" panose="020B0004020202020204" pitchFamily="34" charset="0"/>
+                        </a:rPr>
+                        <a:t>program_state</a:t>
+                      </a:r>
+                      <a:endParaRPr lang="en-US" sz="1100" b="0" i="0" u="none" strike="noStrike" dirty="0">
+                        <a:solidFill>
+                          <a:srgbClr val="000000"/>
+                        </a:solidFill>
+                        <a:effectLst/>
+                        <a:latin typeface="Aptos Narrow" panose="020B0004020202020204" pitchFamily="34" charset="0"/>
+                      </a:endParaRPr>
+                    </a:p>
+                  </a:txBody>
+                  <a:tcPr marL="6350" marR="6350" marT="6350" marB="0" anchor="b"/>
+                </a:tc>
+                <a:tc>
+                  <a:txBody>
+                    <a:bodyPr/>
+                    <a:lstStyle/>
+                    <a:p>
+                      <a:pPr algn="l" fontAlgn="b"/>
+                      <a:r>
+                        <a:rPr lang="en-US" sz="1100" b="0" i="0" u="none" strike="noStrike" dirty="0">
+                          <a:solidFill>
+                            <a:srgbClr val="000000"/>
+                          </a:solidFill>
+                          <a:effectLst/>
+                          <a:latin typeface="Aptos Narrow" panose="020B0004020202020204" pitchFamily="34" charset="0"/>
+                        </a:rPr>
+                        <a:t>varchar(10)</a:t>
+                      </a:r>
+                    </a:p>
+                  </a:txBody>
+                  <a:tcPr marL="6350" marR="6350" marT="6350" marB="0" anchor="b"/>
+                </a:tc>
+                <a:extLst>
+                  <a:ext uri="{0D108BD9-81ED-4DB2-BD59-A6C34878D82A}">
+                    <a16:rowId xmlns:a16="http://schemas.microsoft.com/office/drawing/2014/main" val="3999769234"/>
+                  </a:ext>
+                </a:extLst>
+              </a:tr>
+              <a:tr h="214232">
+                <a:tc>
+                  <a:txBody>
+                    <a:bodyPr/>
+                    <a:lstStyle/>
+                    <a:p>
+                      <a:pPr algn="l" fontAlgn="b"/>
+                      <a:r>
+                        <a:rPr lang="en-US" sz="1100" b="0" i="0" u="none" strike="noStrike" dirty="0" err="1">
+                          <a:solidFill>
+                            <a:srgbClr val="000000"/>
+                          </a:solidFill>
+                          <a:effectLst/>
+                          <a:latin typeface="Aptos Narrow" panose="020B0004020202020204" pitchFamily="34" charset="0"/>
+                        </a:rPr>
+                        <a:t>afm</a:t>
+                      </a:r>
+                      <a:endParaRPr lang="en-US" sz="1100" b="0" i="0" u="none" strike="noStrike" dirty="0">
+                        <a:solidFill>
+                          <a:srgbClr val="000000"/>
+                        </a:solidFill>
+                        <a:effectLst/>
+                        <a:latin typeface="Aptos Narrow" panose="020B0004020202020204" pitchFamily="34" charset="0"/>
+                      </a:endParaRPr>
+                    </a:p>
+                  </a:txBody>
+                  <a:tcPr marL="6350" marR="6350" marT="6350" marB="0" anchor="b"/>
+                </a:tc>
+                <a:tc>
+                  <a:txBody>
+                    <a:bodyPr/>
+                    <a:lstStyle/>
+                    <a:p>
+                      <a:pPr algn="l" fontAlgn="b"/>
+                      <a:r>
+                        <a:rPr lang="en-US" sz="1100" b="0" i="0" u="none" strike="noStrike">
+                          <a:solidFill>
+                            <a:srgbClr val="000000"/>
+                          </a:solidFill>
+                          <a:effectLst/>
+                          <a:latin typeface="Aptos Narrow" panose="020B0004020202020204" pitchFamily="34" charset="0"/>
+                        </a:rPr>
+                        <a:t>varchar(3)</a:t>
+                      </a:r>
+                    </a:p>
+                  </a:txBody>
+                  <a:tcPr marL="6350" marR="6350" marT="6350" marB="0" anchor="b"/>
+                </a:tc>
+                <a:extLst>
+                  <a:ext uri="{0D108BD9-81ED-4DB2-BD59-A6C34878D82A}">
+                    <a16:rowId xmlns:a16="http://schemas.microsoft.com/office/drawing/2014/main" val="2719133080"/>
+                  </a:ext>
+                </a:extLst>
+              </a:tr>
+              <a:tr h="214232">
+                <a:tc>
+                  <a:txBody>
+                    <a:bodyPr/>
+                    <a:lstStyle/>
+                    <a:p>
+                      <a:pPr algn="l" fontAlgn="b"/>
+                      <a:r>
+                        <a:rPr lang="en-US" sz="1100" b="0" i="0" u="none" strike="noStrike" dirty="0" err="1">
+                          <a:solidFill>
+                            <a:srgbClr val="000000"/>
+                          </a:solidFill>
+                          <a:effectLst/>
+                          <a:latin typeface="Aptos Narrow" panose="020B0004020202020204" pitchFamily="34" charset="0"/>
+                        </a:rPr>
+                        <a:t>grant_number</a:t>
+                      </a:r>
+                      <a:endParaRPr lang="en-US" sz="1100" b="0" i="0" u="none" strike="noStrike" dirty="0">
+                        <a:solidFill>
+                          <a:srgbClr val="000000"/>
+                        </a:solidFill>
+                        <a:effectLst/>
+                        <a:latin typeface="Aptos Narrow" panose="020B0004020202020204" pitchFamily="34" charset="0"/>
+                      </a:endParaRPr>
+                    </a:p>
+                  </a:txBody>
+                  <a:tcPr marL="6350" marR="6350" marT="6350" marB="0" anchor="b"/>
+                </a:tc>
+                <a:tc>
+                  <a:txBody>
+                    <a:bodyPr/>
+                    <a:lstStyle/>
+                    <a:p>
+                      <a:pPr algn="l" fontAlgn="b"/>
+                      <a:r>
+                        <a:rPr lang="en-US" sz="1100" b="0" i="0" u="none" strike="noStrike">
+                          <a:solidFill>
+                            <a:srgbClr val="000000"/>
+                          </a:solidFill>
+                          <a:effectLst/>
+                          <a:latin typeface="Aptos Narrow" panose="020B0004020202020204" pitchFamily="34" charset="0"/>
+                        </a:rPr>
+                        <a:t>varchar(20)</a:t>
+                      </a:r>
+                    </a:p>
+                  </a:txBody>
+                  <a:tcPr marL="6350" marR="6350" marT="6350" marB="0" anchor="b"/>
+                </a:tc>
+                <a:extLst>
+                  <a:ext uri="{0D108BD9-81ED-4DB2-BD59-A6C34878D82A}">
+                    <a16:rowId xmlns:a16="http://schemas.microsoft.com/office/drawing/2014/main" val="3469125726"/>
+                  </a:ext>
+                </a:extLst>
+              </a:tr>
+              <a:tr h="214232">
+                <a:tc>
+                  <a:txBody>
+                    <a:bodyPr/>
+                    <a:lstStyle/>
+                    <a:p>
+                      <a:pPr algn="l" fontAlgn="b"/>
+                      <a:r>
+                        <a:rPr lang="en-US" sz="1100" b="0" i="0" u="none" strike="noStrike" dirty="0" err="1">
+                          <a:solidFill>
+                            <a:srgbClr val="000000"/>
+                          </a:solidFill>
+                          <a:effectLst/>
+                          <a:latin typeface="Aptos Narrow" panose="020B0004020202020204" pitchFamily="34" charset="0"/>
+                        </a:rPr>
+                        <a:t>program_name</a:t>
+                      </a:r>
+                      <a:endParaRPr lang="en-US" sz="1100" b="0" i="0" u="none" strike="noStrike" dirty="0">
+                        <a:solidFill>
+                          <a:srgbClr val="000000"/>
+                        </a:solidFill>
+                        <a:effectLst/>
+                        <a:latin typeface="Aptos Narrow" panose="020B0004020202020204" pitchFamily="34" charset="0"/>
+                      </a:endParaRPr>
+                    </a:p>
+                  </a:txBody>
+                  <a:tcPr marL="6350" marR="6350" marT="6350" marB="0" anchor="b"/>
+                </a:tc>
+                <a:tc>
+                  <a:txBody>
+                    <a:bodyPr/>
+                    <a:lstStyle/>
+                    <a:p>
+                      <a:pPr algn="l" fontAlgn="b"/>
+                      <a:r>
+                        <a:rPr lang="en-US" sz="1100" b="0" i="0" u="none" strike="noStrike">
+                          <a:solidFill>
+                            <a:srgbClr val="000000"/>
+                          </a:solidFill>
+                          <a:effectLst/>
+                          <a:latin typeface="Aptos Narrow" panose="020B0004020202020204" pitchFamily="34" charset="0"/>
+                        </a:rPr>
+                        <a:t>varchar(255)</a:t>
+                      </a:r>
+                    </a:p>
+                  </a:txBody>
+                  <a:tcPr marL="6350" marR="6350" marT="6350" marB="0" anchor="b"/>
+                </a:tc>
+                <a:extLst>
+                  <a:ext uri="{0D108BD9-81ED-4DB2-BD59-A6C34878D82A}">
+                    <a16:rowId xmlns:a16="http://schemas.microsoft.com/office/drawing/2014/main" val="583097028"/>
+                  </a:ext>
+                </a:extLst>
+              </a:tr>
+              <a:tr h="214232">
+                <a:tc>
+                  <a:txBody>
+                    <a:bodyPr/>
+                    <a:lstStyle/>
+                    <a:p>
+                      <a:pPr algn="l" fontAlgn="b"/>
+                      <a:r>
+                        <a:rPr lang="en-US" sz="1100" b="0" i="0" u="none" strike="noStrike">
+                          <a:solidFill>
+                            <a:srgbClr val="000000"/>
+                          </a:solidFill>
+                          <a:effectLst/>
+                          <a:latin typeface="Aptos Narrow" panose="020B0004020202020204" pitchFamily="34" charset="0"/>
+                        </a:rPr>
+                        <a:t>year</a:t>
+                      </a:r>
+                    </a:p>
+                  </a:txBody>
+                  <a:tcPr marL="6350" marR="6350" marT="6350" marB="0" anchor="b"/>
+                </a:tc>
+                <a:tc>
+                  <a:txBody>
+                    <a:bodyPr/>
+                    <a:lstStyle/>
+                    <a:p>
+                      <a:pPr algn="l" fontAlgn="b"/>
+                      <a:r>
+                        <a:rPr lang="en-US" sz="1100" b="0" i="0" u="none" strike="noStrike">
+                          <a:solidFill>
+                            <a:srgbClr val="000000"/>
+                          </a:solidFill>
+                          <a:effectLst/>
+                          <a:latin typeface="Aptos Narrow" panose="020B0004020202020204" pitchFamily="34" charset="0"/>
+                        </a:rPr>
+                        <a:t>int</a:t>
+                      </a:r>
+                    </a:p>
+                  </a:txBody>
+                  <a:tcPr marL="6350" marR="6350" marT="6350" marB="0" anchor="b"/>
+                </a:tc>
+                <a:extLst>
+                  <a:ext uri="{0D108BD9-81ED-4DB2-BD59-A6C34878D82A}">
+                    <a16:rowId xmlns:a16="http://schemas.microsoft.com/office/drawing/2014/main" val="3429195299"/>
+                  </a:ext>
+                </a:extLst>
+              </a:tr>
+              <a:tr h="214232">
+                <a:tc>
+                  <a:txBody>
+                    <a:bodyPr/>
+                    <a:lstStyle/>
+                    <a:p>
+                      <a:pPr algn="l" fontAlgn="b"/>
+                      <a:r>
+                        <a:rPr lang="en-US" sz="1100" b="0" i="0" u="none" strike="noStrike">
+                          <a:solidFill>
+                            <a:srgbClr val="000000"/>
+                          </a:solidFill>
+                          <a:effectLst/>
+                          <a:latin typeface="Aptos Narrow" panose="020B0004020202020204" pitchFamily="34" charset="0"/>
+                        </a:rPr>
+                        <a:t>quarter</a:t>
+                      </a:r>
+                    </a:p>
+                  </a:txBody>
+                  <a:tcPr marL="6350" marR="6350" marT="6350" marB="0" anchor="b"/>
+                </a:tc>
+                <a:tc>
+                  <a:txBody>
+                    <a:bodyPr/>
+                    <a:lstStyle/>
+                    <a:p>
+                      <a:pPr algn="l" fontAlgn="b"/>
+                      <a:r>
+                        <a:rPr lang="en-US" sz="1100" b="0" i="0" u="none" strike="noStrike" dirty="0">
+                          <a:solidFill>
+                            <a:srgbClr val="000000"/>
+                          </a:solidFill>
+                          <a:effectLst/>
+                          <a:latin typeface="Aptos Narrow" panose="020B0004020202020204" pitchFamily="34" charset="0"/>
+                        </a:rPr>
+                        <a:t>int</a:t>
+                      </a:r>
+                    </a:p>
+                  </a:txBody>
+                  <a:tcPr marL="6350" marR="6350" marT="6350" marB="0" anchor="b"/>
+                </a:tc>
+                <a:extLst>
+                  <a:ext uri="{0D108BD9-81ED-4DB2-BD59-A6C34878D82A}">
+                    <a16:rowId xmlns:a16="http://schemas.microsoft.com/office/drawing/2014/main" val="794619410"/>
+                  </a:ext>
+                </a:extLst>
+              </a:tr>
+              <a:tr h="214232">
+                <a:tc>
+                  <a:txBody>
+                    <a:bodyPr/>
+                    <a:lstStyle/>
+                    <a:p>
+                      <a:pPr algn="l" fontAlgn="b"/>
+                      <a:r>
+                        <a:rPr lang="en-US" sz="1100" b="0" i="0" u="none" strike="noStrike">
+                          <a:solidFill>
+                            <a:srgbClr val="000000"/>
+                          </a:solidFill>
+                          <a:effectLst/>
+                          <a:latin typeface="Aptos Narrow" panose="020B0004020202020204" pitchFamily="34" charset="0"/>
+                        </a:rPr>
+                        <a:t>metric</a:t>
+                      </a:r>
+                    </a:p>
+                  </a:txBody>
+                  <a:tcPr marL="6350" marR="6350" marT="6350" marB="0" anchor="b"/>
+                </a:tc>
+                <a:tc>
+                  <a:txBody>
+                    <a:bodyPr/>
+                    <a:lstStyle/>
+                    <a:p>
+                      <a:pPr algn="l" fontAlgn="b"/>
+                      <a:r>
+                        <a:rPr lang="en-US" sz="1100" b="0" i="0" u="none" strike="noStrike">
+                          <a:solidFill>
+                            <a:srgbClr val="000000"/>
+                          </a:solidFill>
+                          <a:effectLst/>
+                          <a:latin typeface="Aptos Narrow" panose="020B0004020202020204" pitchFamily="34" charset="0"/>
+                        </a:rPr>
+                        <a:t>varchar(50)</a:t>
+                      </a:r>
+                    </a:p>
+                  </a:txBody>
+                  <a:tcPr marL="6350" marR="6350" marT="6350" marB="0" anchor="b"/>
+                </a:tc>
+                <a:extLst>
+                  <a:ext uri="{0D108BD9-81ED-4DB2-BD59-A6C34878D82A}">
+                    <a16:rowId xmlns:a16="http://schemas.microsoft.com/office/drawing/2014/main" val="1144423865"/>
+                  </a:ext>
+                </a:extLst>
+              </a:tr>
+              <a:tr h="214232">
+                <a:tc>
+                  <a:txBody>
+                    <a:bodyPr/>
+                    <a:lstStyle/>
+                    <a:p>
+                      <a:pPr algn="l" fontAlgn="b"/>
+                      <a:r>
+                        <a:rPr lang="en-US" sz="1100" b="0" i="0" u="none" strike="noStrike" dirty="0">
+                          <a:solidFill>
+                            <a:srgbClr val="000000"/>
+                          </a:solidFill>
+                          <a:effectLst/>
+                          <a:latin typeface="Aptos Narrow" panose="020B0004020202020204" pitchFamily="34" charset="0"/>
+                        </a:rPr>
+                        <a:t>value</a:t>
+                      </a:r>
+                    </a:p>
+                  </a:txBody>
+                  <a:tcPr marL="6350" marR="6350" marT="6350" marB="0" anchor="b"/>
+                </a:tc>
+                <a:tc>
+                  <a:txBody>
+                    <a:bodyPr/>
+                    <a:lstStyle/>
+                    <a:p>
+                      <a:pPr algn="l" fontAlgn="b"/>
+                      <a:r>
+                        <a:rPr lang="en-US" sz="1100" b="0" i="0" u="none" strike="noStrike" dirty="0">
+                          <a:solidFill>
+                            <a:srgbClr val="000000"/>
+                          </a:solidFill>
+                          <a:effectLst/>
+                          <a:latin typeface="Aptos Narrow" panose="020B0004020202020204" pitchFamily="34" charset="0"/>
+                        </a:rPr>
+                        <a:t>numeric</a:t>
+                      </a:r>
+                    </a:p>
+                  </a:txBody>
+                  <a:tcPr marL="6350" marR="6350" marT="6350" marB="0" anchor="b"/>
+                </a:tc>
+                <a:extLst>
+                  <a:ext uri="{0D108BD9-81ED-4DB2-BD59-A6C34878D82A}">
+                    <a16:rowId xmlns:a16="http://schemas.microsoft.com/office/drawing/2014/main" val="4145826066"/>
+                  </a:ext>
+                </a:extLst>
+              </a:tr>
+            </a:tbl>
+          </a:graphicData>
+        </a:graphic>
+      </p:graphicFrame>
+      <p:cxnSp>
+        <p:nvCxnSpPr>
+          <p:cNvPr id="20" name="Straight Connector 19">
+            <a:extLst>
+              <a:ext uri="{FF2B5EF4-FFF2-40B4-BE49-F238E27FC236}">
+                <a16:creationId xmlns:a16="http://schemas.microsoft.com/office/drawing/2014/main" id="{127B6E9F-00C2-2D0B-15D2-020D60F8B58D}"/>
+              </a:ext>
+            </a:extLst>
+          </p:cNvPr>
+          <p:cNvCxnSpPr/>
+          <p:nvPr/>
+        </p:nvCxnSpPr>
+        <p:spPr>
+          <a:xfrm flipH="1">
+            <a:off x="4329395" y="1863090"/>
+            <a:ext cx="166405" cy="0"/>
+          </a:xfrm>
+          <a:prstGeom prst="line">
+            <a:avLst/>
+          </a:prstGeom>
+        </p:spPr>
+        <p:style>
+          <a:lnRef idx="2">
+            <a:schemeClr val="accent1"/>
+          </a:lnRef>
+          <a:fillRef idx="0">
+            <a:schemeClr val="accent1"/>
+          </a:fillRef>
+          <a:effectRef idx="1">
+            <a:schemeClr val="accent1"/>
+          </a:effectRef>
+          <a:fontRef idx="minor">
+            <a:schemeClr val="tx1"/>
+          </a:fontRef>
+        </p:style>
+      </p:cxnSp>
+      <p:cxnSp>
+        <p:nvCxnSpPr>
+          <p:cNvPr id="24" name="Straight Connector 23">
+            <a:extLst>
+              <a:ext uri="{FF2B5EF4-FFF2-40B4-BE49-F238E27FC236}">
+                <a16:creationId xmlns:a16="http://schemas.microsoft.com/office/drawing/2014/main" id="{EAA24400-0BDB-5A6F-7846-CDA7F36A83F8}"/>
+              </a:ext>
+            </a:extLst>
+          </p:cNvPr>
+          <p:cNvCxnSpPr>
+            <a:cxnSpLocks/>
+          </p:cNvCxnSpPr>
+          <p:nvPr/>
+        </p:nvCxnSpPr>
+        <p:spPr>
+          <a:xfrm>
+            <a:off x="4495800" y="1863090"/>
+            <a:ext cx="0" cy="3750310"/>
+          </a:xfrm>
+          <a:prstGeom prst="line">
+            <a:avLst/>
+          </a:prstGeom>
+        </p:spPr>
+        <p:style>
+          <a:lnRef idx="2">
+            <a:schemeClr val="accent1"/>
+          </a:lnRef>
+          <a:fillRef idx="0">
+            <a:schemeClr val="accent1"/>
+          </a:fillRef>
+          <a:effectRef idx="1">
+            <a:schemeClr val="accent1"/>
+          </a:effectRef>
+          <a:fontRef idx="minor">
+            <a:schemeClr val="tx1"/>
+          </a:fontRef>
+        </p:style>
+      </p:cxnSp>
+      <p:cxnSp>
+        <p:nvCxnSpPr>
+          <p:cNvPr id="27" name="Straight Connector 26">
+            <a:extLst>
+              <a:ext uri="{FF2B5EF4-FFF2-40B4-BE49-F238E27FC236}">
+                <a16:creationId xmlns:a16="http://schemas.microsoft.com/office/drawing/2014/main" id="{1CAB8406-9C38-AEE9-9EED-44478F1C036A}"/>
+              </a:ext>
+            </a:extLst>
+          </p:cNvPr>
+          <p:cNvCxnSpPr/>
+          <p:nvPr/>
+        </p:nvCxnSpPr>
+        <p:spPr>
+          <a:xfrm>
+            <a:off x="4495800" y="5613400"/>
+            <a:ext cx="235076" cy="0"/>
+          </a:xfrm>
+          <a:prstGeom prst="line">
+            <a:avLst/>
+          </a:prstGeom>
+        </p:spPr>
+        <p:style>
+          <a:lnRef idx="2">
+            <a:schemeClr val="accent1"/>
+          </a:lnRef>
+          <a:fillRef idx="0">
+            <a:schemeClr val="accent1"/>
+          </a:fillRef>
+          <a:effectRef idx="1">
+            <a:schemeClr val="accent1"/>
+          </a:effectRef>
+          <a:fontRef idx="minor">
+            <a:schemeClr val="tx1"/>
+          </a:fontRef>
+        </p:style>
+      </p:cxnSp>
+      <p:sp>
+        <p:nvSpPr>
+          <p:cNvPr id="32" name="TextBox 31">
+            <a:extLst>
+              <a:ext uri="{FF2B5EF4-FFF2-40B4-BE49-F238E27FC236}">
+                <a16:creationId xmlns:a16="http://schemas.microsoft.com/office/drawing/2014/main" id="{9739A516-2230-38D5-96EB-C32EF5ECA309}"/>
+              </a:ext>
+            </a:extLst>
+          </p:cNvPr>
+          <p:cNvSpPr txBox="1"/>
+          <p:nvPr/>
+        </p:nvSpPr>
+        <p:spPr>
+          <a:xfrm>
+            <a:off x="4437719" y="2975439"/>
+            <a:ext cx="401072" cy="246221"/>
+          </a:xfrm>
+          <a:prstGeom prst="rect">
+            <a:avLst/>
+          </a:prstGeom>
+          <a:noFill/>
+        </p:spPr>
+        <p:txBody>
+          <a:bodyPr wrap="none" rtlCol="0">
+            <a:spAutoFit/>
+          </a:bodyPr>
+          <a:lstStyle/>
+          <a:p>
+            <a:r>
+              <a:rPr lang="en-US" sz="1000" dirty="0"/>
+              <a:t>N:N</a:t>
             </a:r>
           </a:p>
         </p:txBody>
@@ -7150,15 +7937,6 @@
 </file>
 
 <file path=customXml/item2.xml><?xml version="1.0" encoding="utf-8"?>
-<?mso-contentType ?>
-<FormTemplates xmlns="http://schemas.microsoft.com/sharepoint/v3/contenttype/forms">
-  <Display>DocumentLibraryForm</Display>
-  <Edit>DocumentLibraryForm</Edit>
-  <New>DocumentLibraryForm</New>
-</FormTemplates>
-</file>
-
-<file path=customXml/item3.xml><?xml version="1.0" encoding="utf-8"?>
 <p:properties xmlns:p="http://schemas.microsoft.com/office/2006/metadata/properties" xmlns:xsi="http://www.w3.org/2001/XMLSchema-instance" xmlns:pc="http://schemas.microsoft.com/office/infopath/2007/PartnerControls">
   <documentManagement>
     <lcf76f155ced4ddcb4097134ff3c332f xmlns="3bbcc479-542e-45e9-903f-6982a90c1284">
@@ -7167,6 +7945,15 @@
     <TaxCatchAll xmlns="386bc9d2-cd22-4bc8-96bc-475721450571" xsi:nil="true"/>
   </documentManagement>
 </p:properties>
+</file>
+
+<file path=customXml/item3.xml><?xml version="1.0" encoding="utf-8"?>
+<?mso-contentType ?>
+<FormTemplates xmlns="http://schemas.microsoft.com/sharepoint/v3/contenttype/forms">
+  <Display>DocumentLibraryForm</Display>
+  <Edit>DocumentLibraryForm</Edit>
+  <New>DocumentLibraryForm</New>
+</FormTemplates>
 </file>
 
 <file path=customXml/itemProps1.xml><?xml version="1.0" encoding="utf-8"?>
@@ -7189,14 +7976,6 @@
 </file>
 
 <file path=customXml/itemProps2.xml><?xml version="1.0" encoding="utf-8"?>
-<ds:datastoreItem xmlns:ds="http://schemas.openxmlformats.org/officeDocument/2006/customXml" ds:itemID="{3548DD35-F3EA-462E-9EB6-B15ED3B86DDB}">
-  <ds:schemaRefs>
-    <ds:schemaRef ds:uri="http://schemas.microsoft.com/sharepoint/v3/contenttype/forms"/>
-  </ds:schemaRefs>
-</ds:datastoreItem>
-</file>
-
-<file path=customXml/itemProps3.xml><?xml version="1.0" encoding="utf-8"?>
 <ds:datastoreItem xmlns:ds="http://schemas.openxmlformats.org/officeDocument/2006/customXml" ds:itemID="{7C5B355D-AE39-455A-B417-D46D9CE81704}">
   <ds:schemaRefs>
     <ds:schemaRef ds:uri="http://schemas.microsoft.com/office/2006/metadata/properties"/>
@@ -7205,4 +7984,12 @@
     <ds:schemaRef ds:uri="386bc9d2-cd22-4bc8-96bc-475721450571"/>
   </ds:schemaRefs>
 </ds:datastoreItem>
+</file>
+
+<file path=customXml/itemProps3.xml><?xml version="1.0" encoding="utf-8"?>
+<ds:datastoreItem xmlns:ds="http://schemas.openxmlformats.org/officeDocument/2006/customXml" ds:itemID="{3548DD35-F3EA-462E-9EB6-B15ED3B86DDB}">
+  <ds:schemaRefs>
+    <ds:schemaRef ds:uri="http://schemas.microsoft.com/sharepoint/v3/contenttype/forms"/>
+  </ds:schemaRefs>
+</ds:datastoreItem>
 </file>
</xml_diff>